<commit_message>
Commit of BluetoothTest, update on slides, as well as a sample FoneAstra project
</commit_message>
<xml_diff>
--- a/Week5/Slides/Week 5.pptx
+++ b/Week5/Slides/Week 5.pptx
@@ -12,10 +12,10 @@
     <p:sldId id="454" r:id="rId3"/>
     <p:sldId id="453" r:id="rId4"/>
     <p:sldId id="455" r:id="rId5"/>
-    <p:sldId id="458" r:id="rId6"/>
-    <p:sldId id="459" r:id="rId7"/>
-    <p:sldId id="456" r:id="rId8"/>
-    <p:sldId id="457" r:id="rId9"/>
+    <p:sldId id="456" r:id="rId6"/>
+    <p:sldId id="457" r:id="rId7"/>
+    <p:sldId id="458" r:id="rId8"/>
+    <p:sldId id="459" r:id="rId9"/>
     <p:sldId id="257" r:id="rId10"/>
     <p:sldId id="417" r:id="rId11"/>
     <p:sldId id="418" r:id="rId12"/>
@@ -7503,6 +7503,13 @@
   <p:clrMapOvr>
     <a:masterClrMapping/>
   </p:clrMapOvr>
+  <p:timing>
+    <p:tnLst>
+      <p:par>
+        <p:cTn xmlns:p14="http://schemas.microsoft.com/office/powerpoint/2010/main" id="1" dur="indefinite" restart="never" nodeType="tmRoot"/>
+      </p:par>
+    </p:tnLst>
+  </p:timing>
 </p:sld>
 </file>
 
@@ -11823,6 +11830,13 @@
   <p:clrMapOvr>
     <a:masterClrMapping/>
   </p:clrMapOvr>
+  <p:timing>
+    <p:tnLst>
+      <p:par>
+        <p:cTn xmlns:p14="http://schemas.microsoft.com/office/powerpoint/2010/main" id="1" dur="indefinite" restart="never" nodeType="tmRoot"/>
+      </p:par>
+    </p:tnLst>
+  </p:timing>
 </p:sld>
 </file>
 
@@ -11985,6 +11999,13 @@
   <p:clrMapOvr>
     <a:masterClrMapping/>
   </p:clrMapOvr>
+  <p:timing>
+    <p:tnLst>
+      <p:par>
+        <p:cTn xmlns:p14="http://schemas.microsoft.com/office/powerpoint/2010/main" id="1" dur="indefinite" restart="never" nodeType="tmRoot"/>
+      </p:par>
+    </p:tnLst>
+  </p:timing>
 </p:sld>
 </file>
 
@@ -12753,6 +12774,13 @@
   <p:clrMapOvr>
     <a:masterClrMapping/>
   </p:clrMapOvr>
+  <p:timing>
+    <p:tnLst>
+      <p:par>
+        <p:cTn xmlns:p14="http://schemas.microsoft.com/office/powerpoint/2010/main" id="1" dur="indefinite" restart="never" nodeType="tmRoot"/>
+      </p:par>
+    </p:tnLst>
+  </p:timing>
 </p:sld>
 </file>
 
@@ -13533,6 +13561,13 @@
   <p:clrMapOvr>
     <a:masterClrMapping/>
   </p:clrMapOvr>
+  <p:timing>
+    <p:tnLst>
+      <p:par>
+        <p:cTn xmlns:p14="http://schemas.microsoft.com/office/powerpoint/2010/main" id="1" dur="indefinite" restart="never" nodeType="tmRoot"/>
+      </p:par>
+    </p:tnLst>
+  </p:timing>
 </p:sld>
 </file>
 
@@ -14274,6 +14309,13 @@
   <p:clrMapOvr>
     <a:masterClrMapping/>
   </p:clrMapOvr>
+  <p:timing>
+    <p:tnLst>
+      <p:par>
+        <p:cTn xmlns:p14="http://schemas.microsoft.com/office/powerpoint/2010/main" id="1" dur="indefinite" restart="never" nodeType="tmRoot"/>
+      </p:par>
+    </p:tnLst>
+  </p:timing>
 </p:sld>
 </file>
 
@@ -14350,6 +14392,13 @@
   <p:clrMapOvr>
     <a:masterClrMapping/>
   </p:clrMapOvr>
+  <p:timing>
+    <p:tnLst>
+      <p:par>
+        <p:cTn xmlns:p14="http://schemas.microsoft.com/office/powerpoint/2010/main" id="1" dur="indefinite" restart="never" nodeType="tmRoot"/>
+      </p:par>
+    </p:tnLst>
+  </p:timing>
 </p:sld>
 </file>
 
@@ -14946,8 +14995,12 @@
           <a:lstStyle/>
           <a:p>
             <a:r>
-              <a:rPr lang="en-US" dirty="0" smtClean="0"/>
-              <a:t>Homework 6</a:t>
+              <a:rPr lang="en-US" smtClean="0"/>
+              <a:t>Homework </a:t>
+            </a:r>
+            <a:r>
+              <a:rPr lang="en-US" smtClean="0"/>
+              <a:t>5</a:t>
             </a:r>
             <a:endParaRPr lang="en-US" dirty="0"/>
           </a:p>
@@ -15052,6 +15105,13 @@
   <p:clrMapOvr>
     <a:masterClrMapping/>
   </p:clrMapOvr>
+  <p:timing>
+    <p:tnLst>
+      <p:par>
+        <p:cTn xmlns:p14="http://schemas.microsoft.com/office/powerpoint/2010/main" id="1" dur="indefinite" restart="never" nodeType="tmRoot"/>
+      </p:par>
+    </p:tnLst>
+  </p:timing>
 </p:sld>
 </file>
 
@@ -15172,6 +15232,13 @@
   <p:clrMapOvr>
     <a:masterClrMapping/>
   </p:clrMapOvr>
+  <p:timing>
+    <p:tnLst>
+      <p:par>
+        <p:cTn xmlns:p14="http://schemas.microsoft.com/office/powerpoint/2010/main" id="1" dur="indefinite" restart="never" nodeType="tmRoot"/>
+      </p:par>
+    </p:tnLst>
+  </p:timing>
 </p:sld>
 </file>
 
@@ -15244,6 +15311,13 @@
   <p:clrMapOvr>
     <a:masterClrMapping/>
   </p:clrMapOvr>
+  <p:timing>
+    <p:tnLst>
+      <p:par>
+        <p:cTn xmlns:p14="http://schemas.microsoft.com/office/powerpoint/2010/main" id="1" dur="indefinite" restart="never" nodeType="tmRoot"/>
+      </p:par>
+    </p:tnLst>
+  </p:timing>
 </p:sld>
 </file>
 
@@ -15423,6 +15497,13 @@
   <p:clrMapOvr>
     <a:masterClrMapping/>
   </p:clrMapOvr>
+  <p:timing>
+    <p:tnLst>
+      <p:par>
+        <p:cTn xmlns:p14="http://schemas.microsoft.com/office/powerpoint/2010/main" id="1" dur="indefinite" restart="never" nodeType="tmRoot"/>
+      </p:par>
+    </p:tnLst>
+  </p:timing>
 </p:sld>
 </file>
 
@@ -15611,8 +15692,12 @@
           <a:lstStyle/>
           <a:p>
             <a:r>
-              <a:rPr lang="en-US" dirty="0" smtClean="0"/>
-              <a:t>Thread Contention</a:t>
+              <a:rPr lang="en-US" dirty="0" err="1" smtClean="0"/>
+              <a:t>LineGraph</a:t>
+            </a:r>
+            <a:r>
+              <a:rPr lang="en-US" dirty="0" smtClean="0"/>
+              <a:t> Lifecycle</a:t>
             </a:r>
             <a:endParaRPr lang="en-US" dirty="0"/>
           </a:p>
@@ -15635,107 +15720,96 @@
           <a:p>
             <a:r>
               <a:rPr lang="en-US" dirty="0" smtClean="0"/>
-              <a:t>Threads are really starting to get annoying now</a:t>
-            </a:r>
-          </a:p>
-          <a:p>
+              <a:t>You may have noticed </a:t>
+            </a:r>
+            <a:r>
+              <a:rPr lang="en-US" dirty="0" err="1" smtClean="0"/>
+              <a:t>LineGraphs</a:t>
+            </a:r>
+            <a:r>
+              <a:rPr lang="en-US" dirty="0" smtClean="0"/>
+              <a:t> acting strange</a:t>
+            </a:r>
+          </a:p>
+          <a:p>
+            <a:pPr lvl="1"/>
+            <a:r>
+              <a:rPr lang="en-US" dirty="0" smtClean="0"/>
+              <a:t>This happened when we have navigated away, then navigated back</a:t>
+            </a:r>
+          </a:p>
+          <a:p>
+            <a:pPr lvl="1"/>
+            <a:r>
+              <a:rPr lang="en-US" dirty="0" smtClean="0"/>
+              <a:t>For instance, powering off the screen then powering it up again</a:t>
+            </a:r>
+          </a:p>
+          <a:p>
+            <a:pPr lvl="1"/>
             <a:endParaRPr lang="en-US" dirty="0"/>
           </a:p>
           <a:p>
             <a:r>
               <a:rPr lang="en-US" dirty="0" smtClean="0"/>
-              <a:t>It’s getting difficult to deal with passing data around</a:t>
-            </a:r>
-          </a:p>
-          <a:p>
-            <a:pPr lvl="1"/>
-            <a:r>
-              <a:rPr lang="en-US" dirty="0" smtClean="0"/>
-              <a:t>One thread might be replacing a buffer that another thread is using</a:t>
-            </a:r>
-          </a:p>
-          <a:p>
-            <a:pPr lvl="1"/>
+              <a:t>This happens because internal </a:t>
+            </a:r>
+            <a:r>
+              <a:rPr lang="en-US" dirty="0" err="1" smtClean="0"/>
+              <a:t>LineGraph</a:t>
+            </a:r>
+            <a:r>
+              <a:rPr lang="en-US" dirty="0" smtClean="0"/>
+              <a:t> data was not being stored properly between suspend/resume</a:t>
+            </a:r>
+          </a:p>
+          <a:p>
             <a:endParaRPr lang="en-US" dirty="0"/>
           </a:p>
           <a:p>
             <a:r>
               <a:rPr lang="en-US" dirty="0" smtClean="0"/>
-              <a:t>Enter the </a:t>
-            </a:r>
-            <a:r>
-              <a:rPr lang="en-US" dirty="0" smtClean="0">
-                <a:solidFill>
-                  <a:srgbClr val="569CD6"/>
-                </a:solidFill>
-                <a:highlight>
-                  <a:srgbClr val="1E1E1E"/>
-                </a:highlight>
-                <a:latin typeface="Consolas"/>
-              </a:rPr>
-              <a:t>lock</a:t>
-            </a:r>
-            <a:r>
-              <a:rPr lang="en-US" dirty="0" smtClean="0">
-                <a:solidFill>
-                  <a:srgbClr val="DCDCDC"/>
-                </a:solidFill>
-                <a:highlight>
-                  <a:srgbClr val="1E1E1E"/>
-                </a:highlight>
-                <a:latin typeface="Consolas"/>
-              </a:rPr>
-              <a:t>()</a:t>
-            </a:r>
-            <a:r>
-              <a:rPr lang="en-US" dirty="0" smtClean="0"/>
-              <a:t> statement</a:t>
-            </a:r>
-          </a:p>
-          <a:p>
-            <a:pPr lvl="1"/>
-            <a:r>
-              <a:rPr lang="en-US" dirty="0" smtClean="0"/>
-              <a:t>This allows us to “lock” a section of code, based on a key</a:t>
-            </a:r>
-          </a:p>
-          <a:p>
-            <a:pPr lvl="1"/>
-            <a:r>
-              <a:rPr lang="en-US" dirty="0" smtClean="0"/>
-              <a:t>No other thread can enter a locked section of code with that same key</a:t>
-            </a:r>
-          </a:p>
-          <a:p>
-            <a:pPr lvl="1"/>
-            <a:endParaRPr lang="en-US" dirty="0"/>
-          </a:p>
-          <a:p>
-            <a:r>
-              <a:rPr lang="en-US" dirty="0" smtClean="0"/>
-              <a:t>This allows us to modify data without fear</a:t>
-            </a:r>
-          </a:p>
-          <a:p>
-            <a:pPr lvl="1"/>
-            <a:r>
-              <a:rPr lang="en-US" dirty="0" smtClean="0"/>
-              <a:t>Other threads will just sit and wait until we’re done with our locked section</a:t>
-            </a:r>
-            <a:endParaRPr lang="en-US" dirty="0"/>
+              <a:t>To solve this, there is now an “Initialized” event</a:t>
+            </a:r>
+          </a:p>
+          <a:p>
+            <a:pPr lvl="1"/>
+            <a:r>
+              <a:rPr lang="en-US" dirty="0" smtClean="0"/>
+              <a:t>Subscribing to this allows you to re-initialize the </a:t>
+            </a:r>
+            <a:r>
+              <a:rPr lang="en-US" dirty="0" err="1" smtClean="0"/>
+              <a:t>LineGraph</a:t>
+            </a:r>
+            <a:r>
+              <a:rPr lang="en-US" dirty="0"/>
+              <a:t> </a:t>
+            </a:r>
+            <a:r>
+              <a:rPr lang="en-US" dirty="0" smtClean="0"/>
+              <a:t>in C#</a:t>
+            </a:r>
           </a:p>
         </p:txBody>
       </p:sp>
     </p:spTree>
     <p:extLst>
       <p:ext uri="{BB962C8B-B14F-4D97-AF65-F5344CB8AC3E}">
-        <p14:creationId xmlns:p14="http://schemas.microsoft.com/office/powerpoint/2010/main" val="1123115385"/>
+        <p14:creationId xmlns:p14="http://schemas.microsoft.com/office/powerpoint/2010/main" val="4263385308"/>
       </p:ext>
     </p:extLst>
   </p:cSld>
   <p:clrMapOvr>
     <a:masterClrMapping/>
   </p:clrMapOvr>
+  <p:timing>
+    <p:tnLst>
+      <p:par>
+        <p:cTn xmlns:p14="http://schemas.microsoft.com/office/powerpoint/2010/main" id="1" dur="indefinite" restart="never" nodeType="tmRoot"/>
+      </p:par>
+    </p:tnLst>
+  </p:timing>
 </p:sld>
 </file>
 
@@ -15772,8 +15846,12 @@
           <a:lstStyle/>
           <a:p>
             <a:r>
-              <a:rPr lang="en-US" dirty="0" smtClean="0"/>
-              <a:t>Locks Demo</a:t>
+              <a:rPr lang="en-US" dirty="0" err="1" smtClean="0"/>
+              <a:t>LineGraph</a:t>
+            </a:r>
+            <a:r>
+              <a:rPr lang="en-US" dirty="0" smtClean="0"/>
+              <a:t> Lifecycle Demo</a:t>
             </a:r>
             <a:endParaRPr lang="en-US" dirty="0"/>
           </a:p>
@@ -15801,13 +15879,20 @@
     </p:spTree>
     <p:extLst>
       <p:ext uri="{BB962C8B-B14F-4D97-AF65-F5344CB8AC3E}">
-        <p14:creationId xmlns:p14="http://schemas.microsoft.com/office/powerpoint/2010/main" val="2545326407"/>
+        <p14:creationId xmlns:p14="http://schemas.microsoft.com/office/powerpoint/2010/main" val="365639727"/>
       </p:ext>
     </p:extLst>
   </p:cSld>
   <p:clrMapOvr>
     <a:masterClrMapping/>
   </p:clrMapOvr>
+  <p:timing>
+    <p:tnLst>
+      <p:par>
+        <p:cTn xmlns:p14="http://schemas.microsoft.com/office/powerpoint/2010/main" id="1" dur="indefinite" restart="never" nodeType="tmRoot"/>
+      </p:par>
+    </p:tnLst>
+  </p:timing>
 </p:sld>
 </file>
 
@@ -15844,12 +15929,8 @@
           <a:lstStyle/>
           <a:p>
             <a:r>
-              <a:rPr lang="en-US" dirty="0" err="1" smtClean="0"/>
-              <a:t>LineGraph</a:t>
-            </a:r>
-            <a:r>
-              <a:rPr lang="en-US" dirty="0" smtClean="0"/>
-              <a:t> Lifecycle</a:t>
+              <a:rPr lang="en-US" dirty="0" smtClean="0"/>
+              <a:t>Thread Contention</a:t>
             </a:r>
             <a:endParaRPr lang="en-US" dirty="0"/>
           </a:p>
@@ -15872,89 +15953,114 @@
           <a:p>
             <a:r>
               <a:rPr lang="en-US" dirty="0" smtClean="0"/>
-              <a:t>You may have noticed </a:t>
-            </a:r>
-            <a:r>
-              <a:rPr lang="en-US" dirty="0" err="1" smtClean="0"/>
-              <a:t>LineGraphs</a:t>
-            </a:r>
-            <a:r>
-              <a:rPr lang="en-US" dirty="0" smtClean="0"/>
-              <a:t> acting strange</a:t>
-            </a:r>
-          </a:p>
-          <a:p>
-            <a:pPr lvl="1"/>
-            <a:r>
-              <a:rPr lang="en-US" dirty="0" smtClean="0"/>
-              <a:t>This happened when we have navigated away, then navigated back</a:t>
-            </a:r>
-          </a:p>
-          <a:p>
-            <a:pPr lvl="1"/>
-            <a:r>
-              <a:rPr lang="en-US" dirty="0" smtClean="0"/>
-              <a:t>For instance, powering off the screen then powering it up again</a:t>
-            </a:r>
-          </a:p>
-          <a:p>
-            <a:pPr lvl="1"/>
+              <a:t>Threads are really starting to get annoying now</a:t>
+            </a:r>
+          </a:p>
+          <a:p>
             <a:endParaRPr lang="en-US" dirty="0"/>
           </a:p>
           <a:p>
             <a:r>
               <a:rPr lang="en-US" dirty="0" smtClean="0"/>
-              <a:t>This happens because internal </a:t>
-            </a:r>
-            <a:r>
-              <a:rPr lang="en-US" dirty="0" err="1" smtClean="0"/>
-              <a:t>LineGraph</a:t>
-            </a:r>
-            <a:r>
-              <a:rPr lang="en-US" dirty="0" smtClean="0"/>
-              <a:t> data was not being stored properly between suspend/resume</a:t>
-            </a:r>
-          </a:p>
-          <a:p>
+              <a:t>It’s getting difficult to deal with passing data around</a:t>
+            </a:r>
+          </a:p>
+          <a:p>
+            <a:pPr lvl="1"/>
+            <a:r>
+              <a:rPr lang="en-US" dirty="0" smtClean="0"/>
+              <a:t>One thread might be replacing a buffer that another thread is using</a:t>
+            </a:r>
+          </a:p>
+          <a:p>
+            <a:pPr lvl="1"/>
             <a:endParaRPr lang="en-US" dirty="0"/>
           </a:p>
           <a:p>
             <a:r>
               <a:rPr lang="en-US" dirty="0" smtClean="0"/>
-              <a:t>To solve this, there is now an “Initialized” event</a:t>
-            </a:r>
-          </a:p>
-          <a:p>
-            <a:pPr lvl="1"/>
-            <a:r>
-              <a:rPr lang="en-US" dirty="0" smtClean="0"/>
-              <a:t>Subscribing to this allows you to re-initialize the </a:t>
-            </a:r>
-            <a:r>
-              <a:rPr lang="en-US" dirty="0" err="1" smtClean="0"/>
-              <a:t>LineGraph</a:t>
-            </a:r>
-            <a:r>
-              <a:rPr lang="en-US" dirty="0"/>
-              <a:t> </a:t>
-            </a:r>
-            <a:r>
-              <a:rPr lang="en-US" dirty="0" smtClean="0"/>
-              <a:t>in C#</a:t>
-            </a:r>
+              <a:t>Enter the </a:t>
+            </a:r>
+            <a:r>
+              <a:rPr lang="en-US" dirty="0" smtClean="0">
+                <a:solidFill>
+                  <a:srgbClr val="569CD6"/>
+                </a:solidFill>
+                <a:highlight>
+                  <a:srgbClr val="1E1E1E"/>
+                </a:highlight>
+                <a:latin typeface="Consolas"/>
+              </a:rPr>
+              <a:t>lock</a:t>
+            </a:r>
+            <a:r>
+              <a:rPr lang="en-US" dirty="0" smtClean="0">
+                <a:solidFill>
+                  <a:srgbClr val="DCDCDC"/>
+                </a:solidFill>
+                <a:highlight>
+                  <a:srgbClr val="1E1E1E"/>
+                </a:highlight>
+                <a:latin typeface="Consolas"/>
+              </a:rPr>
+              <a:t>()</a:t>
+            </a:r>
+            <a:r>
+              <a:rPr lang="en-US" dirty="0" smtClean="0"/>
+              <a:t> statement</a:t>
+            </a:r>
+          </a:p>
+          <a:p>
+            <a:pPr lvl="1"/>
+            <a:r>
+              <a:rPr lang="en-US" dirty="0" smtClean="0"/>
+              <a:t>This allows us to “lock” a section of code, based on a key</a:t>
+            </a:r>
+          </a:p>
+          <a:p>
+            <a:pPr lvl="1"/>
+            <a:r>
+              <a:rPr lang="en-US" dirty="0" smtClean="0"/>
+              <a:t>No other thread can enter a locked section of code with that same key</a:t>
+            </a:r>
+          </a:p>
+          <a:p>
+            <a:pPr lvl="1"/>
+            <a:endParaRPr lang="en-US" dirty="0"/>
+          </a:p>
+          <a:p>
+            <a:r>
+              <a:rPr lang="en-US" dirty="0" smtClean="0"/>
+              <a:t>This allows us to modify data without fear</a:t>
+            </a:r>
+          </a:p>
+          <a:p>
+            <a:pPr lvl="1"/>
+            <a:r>
+              <a:rPr lang="en-US" dirty="0" smtClean="0"/>
+              <a:t>Other threads will just sit and wait until we’re done with our locked section</a:t>
+            </a:r>
+            <a:endParaRPr lang="en-US" dirty="0"/>
           </a:p>
         </p:txBody>
       </p:sp>
     </p:spTree>
     <p:extLst>
       <p:ext uri="{BB962C8B-B14F-4D97-AF65-F5344CB8AC3E}">
-        <p14:creationId xmlns:p14="http://schemas.microsoft.com/office/powerpoint/2010/main" val="4263385308"/>
+        <p14:creationId xmlns:p14="http://schemas.microsoft.com/office/powerpoint/2010/main" val="1123115385"/>
       </p:ext>
     </p:extLst>
   </p:cSld>
   <p:clrMapOvr>
     <a:masterClrMapping/>
   </p:clrMapOvr>
+  <p:timing>
+    <p:tnLst>
+      <p:par>
+        <p:cTn xmlns:p14="http://schemas.microsoft.com/office/powerpoint/2010/main" id="1" dur="indefinite" restart="never" nodeType="tmRoot"/>
+      </p:par>
+    </p:tnLst>
+  </p:timing>
 </p:sld>
 </file>
 
@@ -15991,12 +16097,8 @@
           <a:lstStyle/>
           <a:p>
             <a:r>
-              <a:rPr lang="en-US" dirty="0" err="1" smtClean="0"/>
-              <a:t>LineGraph</a:t>
-            </a:r>
-            <a:r>
-              <a:rPr lang="en-US" dirty="0" smtClean="0"/>
-              <a:t> Lifecycle Demo</a:t>
+              <a:rPr lang="en-US" dirty="0" smtClean="0"/>
+              <a:t>Locks Demo</a:t>
             </a:r>
             <a:endParaRPr lang="en-US" dirty="0"/>
           </a:p>
@@ -16024,13 +16126,20 @@
     </p:spTree>
     <p:extLst>
       <p:ext uri="{BB962C8B-B14F-4D97-AF65-F5344CB8AC3E}">
-        <p14:creationId xmlns:p14="http://schemas.microsoft.com/office/powerpoint/2010/main" val="365639727"/>
+        <p14:creationId xmlns:p14="http://schemas.microsoft.com/office/powerpoint/2010/main" val="2545326407"/>
       </p:ext>
     </p:extLst>
   </p:cSld>
   <p:clrMapOvr>
     <a:masterClrMapping/>
   </p:clrMapOvr>
+  <p:timing>
+    <p:tnLst>
+      <p:par>
+        <p:cTn xmlns:p14="http://schemas.microsoft.com/office/powerpoint/2010/main" id="1" dur="indefinite" restart="never" nodeType="tmRoot"/>
+      </p:par>
+    </p:tnLst>
+  </p:timing>
 </p:sld>
 </file>
 

</xml_diff>